<commit_message>
Bron-Kerbosch algorithm(optimized with pivot) for maximal cliques in graph
</commit_message>
<xml_diff>
--- a/presentation/midterm/slides.pptx
+++ b/presentation/midterm/slides.pptx
@@ -275,7 +275,7 @@
           <a:p>
             <a:fld id="{5723DDD6-2605-41F5-9472-8D0ABA65B7CB}" type="datetimeFigureOut">
               <a:rPr lang="en-US" smtClean="0"/>
-              <a:t>4/1/2021</a:t>
+              <a:t>4/3/2021</a:t>
             </a:fld>
             <a:endParaRPr lang="en-US"/>
           </a:p>
@@ -475,7 +475,7 @@
           <a:p>
             <a:fld id="{5723DDD6-2605-41F5-9472-8D0ABA65B7CB}" type="datetimeFigureOut">
               <a:rPr lang="en-US" smtClean="0"/>
-              <a:t>4/1/2021</a:t>
+              <a:t>4/3/2021</a:t>
             </a:fld>
             <a:endParaRPr lang="en-US"/>
           </a:p>
@@ -685,7 +685,7 @@
           <a:p>
             <a:fld id="{5723DDD6-2605-41F5-9472-8D0ABA65B7CB}" type="datetimeFigureOut">
               <a:rPr lang="en-US" smtClean="0"/>
-              <a:t>4/1/2021</a:t>
+              <a:t>4/3/2021</a:t>
             </a:fld>
             <a:endParaRPr lang="en-US"/>
           </a:p>
@@ -885,7 +885,7 @@
           <a:p>
             <a:fld id="{5723DDD6-2605-41F5-9472-8D0ABA65B7CB}" type="datetimeFigureOut">
               <a:rPr lang="en-US" smtClean="0"/>
-              <a:t>4/1/2021</a:t>
+              <a:t>4/3/2021</a:t>
             </a:fld>
             <a:endParaRPr lang="en-US"/>
           </a:p>
@@ -1161,7 +1161,7 @@
           <a:p>
             <a:fld id="{5723DDD6-2605-41F5-9472-8D0ABA65B7CB}" type="datetimeFigureOut">
               <a:rPr lang="en-US" smtClean="0"/>
-              <a:t>4/1/2021</a:t>
+              <a:t>4/3/2021</a:t>
             </a:fld>
             <a:endParaRPr lang="en-US"/>
           </a:p>
@@ -1429,7 +1429,7 @@
           <a:p>
             <a:fld id="{5723DDD6-2605-41F5-9472-8D0ABA65B7CB}" type="datetimeFigureOut">
               <a:rPr lang="en-US" smtClean="0"/>
-              <a:t>4/1/2021</a:t>
+              <a:t>4/3/2021</a:t>
             </a:fld>
             <a:endParaRPr lang="en-US"/>
           </a:p>
@@ -1844,7 +1844,7 @@
           <a:p>
             <a:fld id="{5723DDD6-2605-41F5-9472-8D0ABA65B7CB}" type="datetimeFigureOut">
               <a:rPr lang="en-US" smtClean="0"/>
-              <a:t>4/1/2021</a:t>
+              <a:t>4/3/2021</a:t>
             </a:fld>
             <a:endParaRPr lang="en-US"/>
           </a:p>
@@ -1986,7 +1986,7 @@
           <a:p>
             <a:fld id="{5723DDD6-2605-41F5-9472-8D0ABA65B7CB}" type="datetimeFigureOut">
               <a:rPr lang="en-US" smtClean="0"/>
-              <a:t>4/1/2021</a:t>
+              <a:t>4/3/2021</a:t>
             </a:fld>
             <a:endParaRPr lang="en-US"/>
           </a:p>
@@ -2099,7 +2099,7 @@
           <a:p>
             <a:fld id="{5723DDD6-2605-41F5-9472-8D0ABA65B7CB}" type="datetimeFigureOut">
               <a:rPr lang="en-US" smtClean="0"/>
-              <a:t>4/1/2021</a:t>
+              <a:t>4/3/2021</a:t>
             </a:fld>
             <a:endParaRPr lang="en-US"/>
           </a:p>
@@ -2412,7 +2412,7 @@
           <a:p>
             <a:fld id="{5723DDD6-2605-41F5-9472-8D0ABA65B7CB}" type="datetimeFigureOut">
               <a:rPr lang="en-US" smtClean="0"/>
-              <a:t>4/1/2021</a:t>
+              <a:t>4/3/2021</a:t>
             </a:fld>
             <a:endParaRPr lang="en-US"/>
           </a:p>
@@ -2701,7 +2701,7 @@
           <a:p>
             <a:fld id="{5723DDD6-2605-41F5-9472-8D0ABA65B7CB}" type="datetimeFigureOut">
               <a:rPr lang="en-US" smtClean="0"/>
-              <a:t>4/1/2021</a:t>
+              <a:t>4/3/2021</a:t>
             </a:fld>
             <a:endParaRPr lang="en-US"/>
           </a:p>
@@ -2944,7 +2944,7 @@
           <a:p>
             <a:fld id="{5723DDD6-2605-41F5-9472-8D0ABA65B7CB}" type="datetimeFigureOut">
               <a:rPr lang="en-US" smtClean="0"/>
-              <a:t>4/1/2021</a:t>
+              <a:t>4/3/2021</a:t>
             </a:fld>
             <a:endParaRPr lang="en-US"/>
           </a:p>
@@ -4646,7 +4646,7 @@
         <p:spPr>
           <a:xfrm>
             <a:off x="732675" y="5094231"/>
-            <a:ext cx="2721386" cy="646331"/>
+            <a:ext cx="5928226" cy="646331"/>
           </a:xfrm>
           <a:prstGeom prst="rect">
             <a:avLst/>
@@ -4665,7 +4665,15 @@
             </a:r>
             <a:r>
               <a:rPr lang="en-US" dirty="0"/>
-              <a:t> algorithm</a:t>
+              <a:t> algorithm(independent set in G </a:t>
+            </a:r>
+            <a:r>
+              <a:rPr lang="en-US"/>
+              <a:t>is clique </a:t>
+            </a:r>
+            <a:r>
+              <a:rPr lang="en-US" dirty="0"/>
+              <a:t>in G’)</a:t>
             </a:r>
           </a:p>
           <a:p>

</xml_diff>